<commit_message>
Finishing Math tarnsformations section
</commit_message>
<xml_diff>
--- a/Data624TimeSeriesDecompPresentation.pptx
+++ b/Data624TimeSeriesDecompPresentation.pptx
@@ -7,12 +7,14 @@
   <p:sldIdLst>
     <p:sldId id="256" r:id="rId2"/>
     <p:sldId id="257" r:id="rId3"/>
-    <p:sldId id="262" r:id="rId4"/>
-    <p:sldId id="263" r:id="rId5"/>
-    <p:sldId id="258" r:id="rId6"/>
-    <p:sldId id="259" r:id="rId7"/>
-    <p:sldId id="260" r:id="rId8"/>
-    <p:sldId id="261" r:id="rId9"/>
+    <p:sldId id="258" r:id="rId4"/>
+    <p:sldId id="265" r:id="rId5"/>
+    <p:sldId id="264" r:id="rId6"/>
+    <p:sldId id="263" r:id="rId7"/>
+    <p:sldId id="266" r:id="rId8"/>
+    <p:sldId id="259" r:id="rId9"/>
+    <p:sldId id="260" r:id="rId10"/>
+    <p:sldId id="261" r:id="rId11"/>
   </p:sldIdLst>
   <p:sldSz cx="12192000" cy="6858000"/>
   <p:notesSz cx="6858000" cy="9144000"/>
@@ -7765,6 +7767,229 @@
 </p:sld>
 </file>
 
+<file path=ppt/slides/slide10.xml><?xml version="1.0" encoding="utf-8"?>
+<p:sld xmlns:a="http://schemas.openxmlformats.org/drawingml/2006/main" xmlns:r="http://schemas.openxmlformats.org/officeDocument/2006/relationships" xmlns:p="http://schemas.openxmlformats.org/presentationml/2006/main">
+  <p:cSld>
+    <p:spTree>
+      <p:nvGrpSpPr>
+        <p:cNvPr id="1" name=""/>
+        <p:cNvGrpSpPr/>
+        <p:nvPr/>
+      </p:nvGrpSpPr>
+      <p:grpSpPr>
+        <a:xfrm>
+          <a:off x="0" y="0"/>
+          <a:ext cx="0" cy="0"/>
+          <a:chOff x="0" y="0"/>
+          <a:chExt cx="0" cy="0"/>
+        </a:xfrm>
+      </p:grpSpPr>
+      <p:sp>
+        <p:nvSpPr>
+          <p:cNvPr id="2" name="Title 1"/>
+          <p:cNvSpPr>
+            <a:spLocks noGrp="1"/>
+          </p:cNvSpPr>
+          <p:nvPr>
+            <p:ph type="title"/>
+          </p:nvPr>
+        </p:nvSpPr>
+        <p:spPr>
+          <a:xfrm>
+            <a:off x="680321" y="753229"/>
+            <a:ext cx="9613861" cy="592096"/>
+          </a:xfrm>
+        </p:spPr>
+        <p:txBody>
+          <a:bodyPr/>
+          <a:lstStyle/>
+          <a:p>
+            <a:r>
+              <a:rPr lang="en-US" dirty="0"/>
+              <a:t>Time Series Decomposition</a:t>
+            </a:r>
+          </a:p>
+        </p:txBody>
+      </p:sp>
+      <p:sp>
+        <p:nvSpPr>
+          <p:cNvPr id="3" name="Content Placeholder 2"/>
+          <p:cNvSpPr>
+            <a:spLocks noGrp="1"/>
+          </p:cNvSpPr>
+          <p:nvPr>
+            <p:ph idx="1"/>
+          </p:nvPr>
+        </p:nvSpPr>
+        <p:spPr>
+          <a:xfrm>
+            <a:off x="680320" y="2347383"/>
+            <a:ext cx="9613861" cy="4250539"/>
+          </a:xfrm>
+        </p:spPr>
+        <p:txBody>
+          <a:bodyPr/>
+          <a:lstStyle/>
+          <a:p>
+            <a:pPr marL="0" indent="0">
+              <a:buNone/>
+            </a:pPr>
+            <a:r>
+              <a:rPr lang="en-US" b="1" dirty="0"/>
+              <a:t>Inflation Adjustments</a:t>
+            </a:r>
+          </a:p>
+          <a:p>
+            <a:pPr marL="0" indent="0">
+              <a:buNone/>
+            </a:pPr>
+            <a:r>
+              <a:rPr lang="en-US" sz="1600" b="1" dirty="0"/>
+              <a:t>Logarithmic</a:t>
+            </a:r>
+            <a:endParaRPr lang="en-US" sz="1400" b="1" dirty="0"/>
+          </a:p>
+          <a:p>
+            <a:pPr marL="0" indent="0">
+              <a:buNone/>
+            </a:pPr>
+            <a:r>
+              <a:rPr lang="en-US" sz="1200" dirty="0"/>
+              <a:t>Some text.</a:t>
+            </a:r>
+          </a:p>
+          <a:p>
+            <a:pPr marL="0" indent="0">
+              <a:buNone/>
+            </a:pPr>
+            <a:endParaRPr lang="en-US" sz="1600" b="1" dirty="0"/>
+          </a:p>
+          <a:p>
+            <a:pPr marL="0" indent="0">
+              <a:buNone/>
+            </a:pPr>
+            <a:r>
+              <a:rPr lang="en-US" sz="1600" b="1" dirty="0"/>
+              <a:t>Power (x√,x3)</a:t>
+            </a:r>
+          </a:p>
+          <a:p>
+            <a:pPr marL="0" indent="0">
+              <a:buNone/>
+            </a:pPr>
+            <a:r>
+              <a:rPr lang="en-US" sz="1200" dirty="0"/>
+              <a:t>Some text.</a:t>
+            </a:r>
+          </a:p>
+          <a:p>
+            <a:pPr marL="0" indent="0">
+              <a:buNone/>
+            </a:pPr>
+            <a:endParaRPr lang="en-US" sz="1200" dirty="0"/>
+          </a:p>
+          <a:p>
+            <a:pPr marL="0" indent="0">
+              <a:buNone/>
+            </a:pPr>
+            <a:r>
+              <a:rPr lang="en-US" sz="1600" b="1" dirty="0"/>
+              <a:t>Inverse</a:t>
+            </a:r>
+          </a:p>
+          <a:p>
+            <a:pPr marL="0" indent="0">
+              <a:buNone/>
+            </a:pPr>
+            <a:endParaRPr lang="en-US" sz="1200" dirty="0"/>
+          </a:p>
+        </p:txBody>
+      </p:sp>
+      <p:sp>
+        <p:nvSpPr>
+          <p:cNvPr id="4" name="TextBox 3"/>
+          <p:cNvSpPr txBox="1"/>
+          <p:nvPr/>
+        </p:nvSpPr>
+        <p:spPr>
+          <a:xfrm>
+            <a:off x="948488" y="1287100"/>
+            <a:ext cx="4078361" cy="369332"/>
+          </a:xfrm>
+          <a:prstGeom prst="rect">
+            <a:avLst/>
+          </a:prstGeom>
+          <a:noFill/>
+        </p:spPr>
+        <p:txBody>
+          <a:bodyPr wrap="none" rtlCol="0">
+            <a:spAutoFit/>
+          </a:bodyPr>
+          <a:lstStyle/>
+          <a:p>
+            <a:r>
+              <a:rPr lang="en-US" dirty="0"/>
+              <a:t>Transformation and Adjustment Types</a:t>
+            </a:r>
+          </a:p>
+        </p:txBody>
+      </p:sp>
+      <p:sp>
+        <p:nvSpPr>
+          <p:cNvPr id="5" name="TextBox 4">
+            <a:extLst>
+              <a:ext uri="{FF2B5EF4-FFF2-40B4-BE49-F238E27FC236}">
+                <a16:creationId xmlns:a16="http://schemas.microsoft.com/office/drawing/2014/main" id="{7895024F-CFF8-2343-A5E4-E5E4E3EF9E24}"/>
+              </a:ext>
+            </a:extLst>
+          </p:cNvPr>
+          <p:cNvSpPr txBox="1"/>
+          <p:nvPr/>
+        </p:nvSpPr>
+        <p:spPr>
+          <a:xfrm>
+            <a:off x="10753438" y="1025490"/>
+            <a:ext cx="1227965" cy="523220"/>
+          </a:xfrm>
+          <a:prstGeom prst="rect">
+            <a:avLst/>
+          </a:prstGeom>
+          <a:noFill/>
+        </p:spPr>
+        <p:txBody>
+          <a:bodyPr wrap="none" rtlCol="0">
+            <a:spAutoFit/>
+          </a:bodyPr>
+          <a:lstStyle/>
+          <a:p>
+            <a:pPr algn="ctr"/>
+            <a:r>
+              <a:rPr lang="en-US" sz="1400" dirty="0"/>
+              <a:t>Inflation</a:t>
+            </a:r>
+          </a:p>
+          <a:p>
+            <a:pPr algn="ctr"/>
+            <a:r>
+              <a:rPr lang="en-US" sz="1400" dirty="0"/>
+              <a:t> Adjustments</a:t>
+            </a:r>
+          </a:p>
+        </p:txBody>
+      </p:sp>
+    </p:spTree>
+    <p:extLst>
+      <p:ext uri="{BB962C8B-B14F-4D97-AF65-F5344CB8AC3E}">
+        <p14:creationId xmlns:p14="http://schemas.microsoft.com/office/powerpoint/2010/main" val="174790273"/>
+      </p:ext>
+    </p:extLst>
+  </p:cSld>
+  <p:clrMapOvr>
+    <a:masterClrMapping/>
+  </p:clrMapOvr>
+</p:sld>
+</file>
+
 <file path=ppt/slides/slide2.xml><?xml version="1.0" encoding="utf-8"?>
 <p:sld xmlns:a="http://schemas.openxmlformats.org/drawingml/2006/main" xmlns:r="http://schemas.openxmlformats.org/officeDocument/2006/relationships" xmlns:p="http://schemas.openxmlformats.org/presentationml/2006/main">
   <p:cSld>
@@ -7991,7 +8216,9 @@
           </a:xfrm>
         </p:spPr>
         <p:txBody>
-          <a:bodyPr/>
+          <a:bodyPr>
+            <a:normAutofit/>
+          </a:bodyPr>
           <a:lstStyle/>
           <a:p>
             <a:pPr marL="0" indent="0">
@@ -8008,9 +8235,25 @@
             </a:pPr>
             <a:r>
               <a:rPr lang="en-US" sz="1600" b="1" dirty="0"/>
-              <a:t>Logarithmic</a:t>
-            </a:r>
-            <a:endParaRPr lang="en-US" sz="1400" b="1" dirty="0"/>
+              <a:t>Power Transformations </a:t>
+            </a:r>
+            <a:r>
+              <a:rPr lang="en-US" sz="1600" b="1" i="1" dirty="0"/>
+              <a:t>√(𝑥), (𝑥)</a:t>
+            </a:r>
+            <a:r>
+              <a:rPr lang="en-US" sz="1600" b="1" i="1" baseline="30000" dirty="0"/>
+              <a:t>1/3</a:t>
+            </a:r>
+            <a:r>
+              <a:rPr lang="en-US" sz="1600" b="1" i="1" dirty="0"/>
+              <a:t>, log(𝑥), Box Cox </a:t>
+            </a:r>
+            <a:r>
+              <a:rPr lang="en-US" sz="1600" b="1" i="1" baseline="30000" dirty="0"/>
+              <a:t> </a:t>
+            </a:r>
+            <a:endParaRPr lang="en-US" sz="1200" i="1" baseline="30000" dirty="0"/>
           </a:p>
           <a:p>
             <a:pPr marL="0" indent="0">
@@ -8018,15 +8261,16 @@
             </a:pPr>
             <a:r>
               <a:rPr lang="en-US" sz="1200" dirty="0"/>
-              <a:t>Useful for correcting heteroskedasticity (</a:t>
-            </a:r>
-            <a:r>
-              <a:rPr lang="en-US" sz="1200" i="1" dirty="0"/>
-              <a:t>variance gets larger over time</a:t>
-            </a:r>
+              <a:t>Power transformations are used for variance stabilization and normalization.</a:t>
+            </a:r>
+          </a:p>
+          <a:p>
+            <a:pPr marL="0" indent="0">
+              <a:buNone/>
+            </a:pPr>
             <a:r>
               <a:rPr lang="en-US" sz="1200" dirty="0"/>
-              <a:t>) prior to modeling.</a:t>
+              <a:t>In the context of a time series, power transformations are useful for removing change in variance over time.</a:t>
             </a:r>
           </a:p>
           <a:p>
@@ -8039,6 +8283,82 @@
             <a:pPr marL="0" indent="0">
               <a:buNone/>
             </a:pPr>
+            <a:r>
+              <a:rPr lang="en-US" sz="1400" dirty="0"/>
+              <a:t>The most common power transformations are:</a:t>
+            </a:r>
+          </a:p>
+          <a:p>
+            <a:pPr marL="342900" indent="-342900">
+              <a:buAutoNum type="alphaUcPeriod"/>
+            </a:pPr>
+            <a:r>
+              <a:rPr lang="en-US" sz="1400" dirty="0"/>
+              <a:t>Square root -&gt; (√𝑥)</a:t>
+            </a:r>
+            <a:br>
+              <a:rPr lang="en-US" sz="1400" dirty="0"/>
+            </a:br>
+            <a:endParaRPr lang="en-US" sz="1400" dirty="0"/>
+          </a:p>
+          <a:p>
+            <a:pPr marL="342900" indent="-342900">
+              <a:buFont typeface="Arial" panose="020B0604020202020204" pitchFamily="34" charset="0"/>
+              <a:buAutoNum type="alphaUcPeriod"/>
+            </a:pPr>
+            <a:r>
+              <a:rPr lang="en-US" sz="1400" dirty="0"/>
+              <a:t>Cube root -&gt; (𝑥)</a:t>
+            </a:r>
+            <a:r>
+              <a:rPr lang="en-US" sz="1400" baseline="30000" dirty="0"/>
+              <a:t>1/3</a:t>
+            </a:r>
+            <a:br>
+              <a:rPr lang="en-US" sz="1400" baseline="30000" dirty="0"/>
+            </a:br>
+            <a:endParaRPr lang="en-US" sz="1400" baseline="30000" dirty="0"/>
+          </a:p>
+          <a:p>
+            <a:pPr marL="342900" indent="-342900">
+              <a:buFont typeface="Arial" panose="020B0604020202020204" pitchFamily="34" charset="0"/>
+              <a:buAutoNum type="alphaUcPeriod"/>
+            </a:pPr>
+            <a:r>
+              <a:rPr lang="en-US" sz="1400" dirty="0"/>
+              <a:t>Log -&gt; log(𝑥)</a:t>
+            </a:r>
+            <a:br>
+              <a:rPr lang="en-US" sz="1400" dirty="0"/>
+            </a:br>
+            <a:endParaRPr lang="en-US" sz="1400" dirty="0"/>
+          </a:p>
+          <a:p>
+            <a:pPr marL="342900" indent="-342900">
+              <a:buFont typeface="Arial" panose="020B0604020202020204" pitchFamily="34" charset="0"/>
+              <a:buAutoNum type="alphaUcPeriod"/>
+            </a:pPr>
+            <a:r>
+              <a:rPr lang="en-US" sz="1400" dirty="0"/>
+              <a:t>Box Cox</a:t>
+            </a:r>
+          </a:p>
+          <a:p>
+            <a:pPr marL="0" indent="0">
+              <a:buNone/>
+            </a:pPr>
+            <a:endParaRPr lang="en-US" sz="1400" baseline="30000" dirty="0"/>
+          </a:p>
+          <a:p>
+            <a:pPr marL="342900" indent="-342900">
+              <a:buAutoNum type="alphaUcPeriod"/>
+            </a:pPr>
+            <a:endParaRPr lang="en-US" sz="1400" dirty="0"/>
+          </a:p>
+          <a:p>
+            <a:pPr marL="0" indent="0">
+              <a:buNone/>
+            </a:pPr>
             <a:endParaRPr lang="en-US" sz="1200" dirty="0"/>
           </a:p>
           <a:p>
@@ -8051,7 +8371,7 @@
             <a:pPr marL="0" indent="0">
               <a:buNone/>
             </a:pPr>
-            <a:endParaRPr lang="en-US" sz="1600" b="1" dirty="0"/>
+            <a:endParaRPr lang="en-US" sz="1200" dirty="0"/>
           </a:p>
           <a:p>
             <a:pPr marL="0" indent="0">
@@ -8133,40 +8453,10 @@
           </a:p>
         </p:txBody>
       </p:sp>
-      <p:pic>
-        <p:nvPicPr>
-          <p:cNvPr id="8" name="Picture 7" descr="Chart, scatter chart&#10;&#10;Description automatically generated">
-            <a:extLst>
-              <a:ext uri="{FF2B5EF4-FFF2-40B4-BE49-F238E27FC236}">
-                <a16:creationId xmlns:a16="http://schemas.microsoft.com/office/drawing/2014/main" id="{74C57507-D85A-3847-A404-7235EA435249}"/>
-              </a:ext>
-            </a:extLst>
-          </p:cNvPr>
-          <p:cNvPicPr>
-            <a:picLocks noChangeAspect="1"/>
-          </p:cNvPicPr>
-          <p:nvPr/>
-        </p:nvPicPr>
-        <p:blipFill>
-          <a:blip r:embed="rId2"/>
-          <a:stretch>
-            <a:fillRect/>
-          </a:stretch>
-        </p:blipFill>
-        <p:spPr>
-          <a:xfrm>
-            <a:off x="800115" y="3462336"/>
-            <a:ext cx="6126202" cy="3092095"/>
-          </a:xfrm>
-          <a:prstGeom prst="rect">
-            <a:avLst/>
-          </a:prstGeom>
-        </p:spPr>
-      </p:pic>
     </p:spTree>
     <p:extLst>
       <p:ext uri="{BB962C8B-B14F-4D97-AF65-F5344CB8AC3E}">
-        <p14:creationId xmlns:p14="http://schemas.microsoft.com/office/powerpoint/2010/main" val="3588662481"/>
+        <p14:creationId xmlns:p14="http://schemas.microsoft.com/office/powerpoint/2010/main" val="142848313"/>
       </p:ext>
     </p:extLst>
   </p:cSld>
@@ -8237,17 +8527,18 @@
           </a:xfrm>
         </p:spPr>
         <p:txBody>
-          <a:bodyPr/>
+          <a:bodyPr>
+            <a:normAutofit/>
+          </a:bodyPr>
           <a:lstStyle/>
           <a:p>
             <a:pPr marL="0" indent="0">
               <a:buNone/>
             </a:pPr>
             <a:r>
-              <a:rPr lang="en-US" sz="1600" b="1" dirty="0"/>
-              <a:t>Logarithmic</a:t>
-            </a:r>
-            <a:endParaRPr lang="en-US" sz="1400" b="1" dirty="0"/>
+              <a:rPr lang="en-US" sz="1400" dirty="0"/>
+              <a:t>A. Square root -&gt; (√𝑥) </a:t>
+            </a:r>
           </a:p>
           <a:p>
             <a:pPr marL="0" indent="0">
@@ -8255,22 +8546,101 @@
             </a:pPr>
             <a:r>
               <a:rPr lang="en-US" sz="1200" dirty="0"/>
-              <a:t>Useful for normalizing data.</a:t>
-            </a:r>
+              <a:t>Used to make a time series with a quadratic growth trend linear by taking the square root.</a:t>
+            </a:r>
+            <a:endParaRPr lang="en-US" sz="1400" baseline="30000" dirty="0"/>
           </a:p>
           <a:p>
             <a:pPr marL="0" indent="0">
               <a:buNone/>
             </a:pPr>
-            <a:r>
-              <a:rPr lang="en-US" sz="1200" dirty="0"/>
-              <a:t>A log transform will transform skewed data to approximately conform to normality.</a:t>
-            </a:r>
+            <a:endParaRPr lang="en-US" sz="1400" baseline="30000" dirty="0"/>
           </a:p>
           <a:p>
             <a:pPr marL="0" indent="0">
               <a:buNone/>
             </a:pPr>
+            <a:endParaRPr lang="en-US" sz="1400" baseline="30000" dirty="0"/>
+          </a:p>
+          <a:p>
+            <a:pPr marL="0" indent="0">
+              <a:buNone/>
+            </a:pPr>
+            <a:endParaRPr lang="en-US" sz="1400" baseline="30000" dirty="0"/>
+          </a:p>
+          <a:p>
+            <a:pPr marL="0" indent="0">
+              <a:buNone/>
+            </a:pPr>
+            <a:endParaRPr lang="en-US" sz="1400" baseline="30000" dirty="0"/>
+          </a:p>
+          <a:p>
+            <a:pPr marL="0" indent="0">
+              <a:buNone/>
+            </a:pPr>
+            <a:endParaRPr lang="en-US" sz="1400" baseline="30000" dirty="0"/>
+          </a:p>
+          <a:p>
+            <a:pPr marL="0" indent="0">
+              <a:buNone/>
+            </a:pPr>
+            <a:endParaRPr lang="en-US" sz="1400" baseline="30000" dirty="0"/>
+          </a:p>
+          <a:p>
+            <a:pPr marL="0" indent="0">
+              <a:buNone/>
+            </a:pPr>
+            <a:endParaRPr lang="en-US" sz="1400" baseline="30000" dirty="0"/>
+          </a:p>
+          <a:p>
+            <a:pPr marL="0" indent="0">
+              <a:buNone/>
+            </a:pPr>
+            <a:endParaRPr lang="en-US" sz="1400" baseline="30000" dirty="0"/>
+          </a:p>
+          <a:p>
+            <a:pPr marL="0" indent="0">
+              <a:buNone/>
+            </a:pPr>
+            <a:endParaRPr lang="en-US" sz="1400" dirty="0"/>
+          </a:p>
+          <a:p>
+            <a:pPr marL="0" indent="0">
+              <a:buNone/>
+            </a:pPr>
+            <a:endParaRPr lang="en-US" sz="1000" b="1" i="1" dirty="0"/>
+          </a:p>
+          <a:p>
+            <a:pPr marL="0" indent="0">
+              <a:buNone/>
+            </a:pPr>
+            <a:endParaRPr lang="en-US" sz="1000" b="1" i="1" dirty="0"/>
+          </a:p>
+          <a:p>
+            <a:pPr marL="0" indent="0">
+              <a:buNone/>
+            </a:pPr>
+            <a:endParaRPr lang="en-US" sz="1000" b="1" i="1" dirty="0"/>
+          </a:p>
+          <a:p>
+            <a:pPr marL="0" indent="0">
+              <a:buNone/>
+            </a:pPr>
+            <a:r>
+              <a:rPr lang="en-US" sz="1000" b="1" i="1" dirty="0"/>
+              <a:t>Before Square Root transformation.			               After Square Root transformation.</a:t>
+            </a:r>
+          </a:p>
+          <a:p>
+            <a:pPr marL="0" indent="0">
+              <a:buNone/>
+            </a:pPr>
+            <a:endParaRPr lang="en-US" sz="1400" dirty="0"/>
+          </a:p>
+          <a:p>
+            <a:pPr marL="0" indent="0">
+              <a:buNone/>
+            </a:pPr>
             <a:endParaRPr lang="en-US" sz="1200" dirty="0"/>
           </a:p>
           <a:p>
@@ -8284,60 +8654,6 @@
               <a:buNone/>
             </a:pPr>
             <a:endParaRPr lang="en-US" sz="1200" dirty="0"/>
-          </a:p>
-          <a:p>
-            <a:pPr marL="0" indent="0">
-              <a:buNone/>
-            </a:pPr>
-            <a:endParaRPr lang="en-US" sz="1200" dirty="0"/>
-          </a:p>
-          <a:p>
-            <a:pPr marL="0" indent="0">
-              <a:buNone/>
-            </a:pPr>
-            <a:endParaRPr lang="en-US" sz="1600" b="1" dirty="0"/>
-          </a:p>
-          <a:p>
-            <a:pPr marL="0" indent="0">
-              <a:buNone/>
-            </a:pPr>
-            <a:endParaRPr lang="en-US" sz="1600" b="1" dirty="0"/>
-          </a:p>
-          <a:p>
-            <a:pPr marL="0" indent="0">
-              <a:buNone/>
-            </a:pPr>
-            <a:endParaRPr lang="en-US" sz="1600" b="1" dirty="0"/>
-          </a:p>
-          <a:p>
-            <a:pPr marL="0" indent="0">
-              <a:buNone/>
-            </a:pPr>
-            <a:endParaRPr lang="en-US" sz="1600" b="1" dirty="0"/>
-          </a:p>
-          <a:p>
-            <a:pPr marL="0" indent="0">
-              <a:buNone/>
-            </a:pPr>
-            <a:endParaRPr lang="en-US" sz="1600" b="1" dirty="0"/>
-          </a:p>
-          <a:p>
-            <a:pPr marL="0" indent="0">
-              <a:buNone/>
-            </a:pPr>
-            <a:r>
-              <a:rPr lang="en-US" sz="1050" b="1" i="1" dirty="0"/>
-              <a:t>       Before Logarithmic Transformation</a:t>
-            </a:r>
-            <a:r>
-              <a:rPr lang="en-US" sz="1050" dirty="0"/>
-              <a:t>                              </a:t>
-            </a:r>
-            <a:r>
-              <a:rPr lang="en-US" sz="1050" b="1" i="1" dirty="0"/>
-              <a:t>After Logarithmic Transformation</a:t>
-            </a:r>
-            <a:endParaRPr lang="en-US" sz="1050" dirty="0"/>
           </a:p>
           <a:p>
             <a:pPr marL="0" indent="0">
@@ -8421,10 +8737,10 @@
       </p:sp>
       <p:pic>
         <p:nvPicPr>
-          <p:cNvPr id="7" name="Picture 6" descr="Chart, histogram&#10;&#10;Description automatically generated">
+          <p:cNvPr id="7" name="Picture 6" descr="Histogram&#10;&#10;Description automatically generated">
             <a:extLst>
               <a:ext uri="{FF2B5EF4-FFF2-40B4-BE49-F238E27FC236}">
-                <a16:creationId xmlns:a16="http://schemas.microsoft.com/office/drawing/2014/main" id="{A1C5E6CC-0287-C642-8BC1-95A337424022}"/>
+                <a16:creationId xmlns:a16="http://schemas.microsoft.com/office/drawing/2014/main" id="{3758A71E-6070-AB44-8DCA-26F68C3C3468}"/>
               </a:ext>
             </a:extLst>
           </p:cNvPr>
@@ -8441,8 +8757,38 @@
         </p:blipFill>
         <p:spPr>
           <a:xfrm>
-            <a:off x="775138" y="3355428"/>
-            <a:ext cx="6277303" cy="2615544"/>
+            <a:off x="680321" y="3054919"/>
+            <a:ext cx="3745616" cy="2814443"/>
+          </a:xfrm>
+          <a:prstGeom prst="rect">
+            <a:avLst/>
+          </a:prstGeom>
+        </p:spPr>
+      </p:pic>
+      <p:pic>
+        <p:nvPicPr>
+          <p:cNvPr id="10" name="Picture 9" descr="Chart&#10;&#10;Description automatically generated with medium confidence">
+            <a:extLst>
+              <a:ext uri="{FF2B5EF4-FFF2-40B4-BE49-F238E27FC236}">
+                <a16:creationId xmlns:a16="http://schemas.microsoft.com/office/drawing/2014/main" id="{60716CD1-974F-9743-8F8A-ABC453B8DA72}"/>
+              </a:ext>
+            </a:extLst>
+          </p:cNvPr>
+          <p:cNvPicPr>
+            <a:picLocks noChangeAspect="1"/>
+          </p:cNvPicPr>
+          <p:nvPr/>
+        </p:nvPicPr>
+        <p:blipFill>
+          <a:blip r:embed="rId3"/>
+          <a:stretch>
+            <a:fillRect/>
+          </a:stretch>
+        </p:blipFill>
+        <p:spPr>
+          <a:xfrm>
+            <a:off x="5834351" y="3054918"/>
+            <a:ext cx="3863428" cy="2814443"/>
           </a:xfrm>
           <a:prstGeom prst="rect">
             <a:avLst/>
@@ -8452,7 +8798,7 @@
     </p:spTree>
     <p:extLst>
       <p:ext uri="{BB962C8B-B14F-4D97-AF65-F5344CB8AC3E}">
-        <p14:creationId xmlns:p14="http://schemas.microsoft.com/office/powerpoint/2010/main" val="2941228201"/>
+        <p14:creationId xmlns:p14="http://schemas.microsoft.com/office/powerpoint/2010/main" val="2443802054"/>
       </p:ext>
     </p:extLst>
   </p:cSld>
@@ -8523,15 +8869,21 @@
           </a:xfrm>
         </p:spPr>
         <p:txBody>
-          <a:bodyPr/>
+          <a:bodyPr>
+            <a:normAutofit/>
+          </a:bodyPr>
           <a:lstStyle/>
           <a:p>
             <a:pPr marL="0" indent="0">
               <a:buNone/>
             </a:pPr>
             <a:r>
-              <a:rPr lang="en-US" sz="1600" b="1" dirty="0"/>
-              <a:t>Power (x√,x3)</a:t>
+              <a:rPr lang="en-US" sz="1400" dirty="0"/>
+              <a:t>B. Cube root -&gt; (𝑥)</a:t>
+            </a:r>
+            <a:r>
+              <a:rPr lang="en-US" sz="1400" baseline="30000" dirty="0"/>
+              <a:t>1/3</a:t>
             </a:r>
           </a:p>
           <a:p>
@@ -8540,48 +8892,96 @@
             </a:pPr>
             <a:r>
               <a:rPr lang="en-US" sz="1200" dirty="0"/>
-              <a:t>Some text.</a:t>
-            </a:r>
+              <a:t>Used to make a time series with a cubic growth trend linear by transforming the data to its cube root.</a:t>
+            </a:r>
+            <a:endParaRPr lang="en-US" sz="1400" baseline="30000" dirty="0"/>
           </a:p>
           <a:p>
             <a:pPr marL="0" indent="0">
               <a:buNone/>
             </a:pPr>
+            <a:endParaRPr lang="en-US" sz="1400" baseline="30000" dirty="0"/>
+          </a:p>
+          <a:p>
+            <a:pPr marL="0" indent="0">
+              <a:buNone/>
+            </a:pPr>
+            <a:endParaRPr lang="en-US" sz="1400" baseline="30000" dirty="0"/>
+          </a:p>
+          <a:p>
+            <a:pPr marL="0" indent="0">
+              <a:buNone/>
+            </a:pPr>
+            <a:endParaRPr lang="en-US" sz="1400" baseline="30000" dirty="0"/>
+          </a:p>
+          <a:p>
+            <a:pPr marL="0" indent="0">
+              <a:buNone/>
+            </a:pPr>
+            <a:endParaRPr lang="en-US" sz="1400" baseline="30000" dirty="0"/>
+          </a:p>
+          <a:p>
+            <a:pPr marL="0" indent="0">
+              <a:buNone/>
+            </a:pPr>
+            <a:endParaRPr lang="en-US" sz="1400" baseline="30000" dirty="0"/>
+          </a:p>
+          <a:p>
+            <a:pPr marL="0" indent="0">
+              <a:buNone/>
+            </a:pPr>
+            <a:endParaRPr lang="en-US" sz="1400" baseline="30000" dirty="0"/>
+          </a:p>
+          <a:p>
+            <a:pPr marL="0" indent="0">
+              <a:buNone/>
+            </a:pPr>
+            <a:endParaRPr lang="en-US" sz="1400" baseline="30000" dirty="0"/>
+          </a:p>
+          <a:p>
+            <a:pPr marL="0" indent="0">
+              <a:buNone/>
+            </a:pPr>
+            <a:endParaRPr lang="en-US" sz="1400" baseline="30000" dirty="0"/>
+          </a:p>
+          <a:p>
+            <a:pPr marL="0" indent="0">
+              <a:buNone/>
+            </a:pPr>
+            <a:endParaRPr lang="en-US" sz="1400" dirty="0"/>
+          </a:p>
+          <a:p>
+            <a:pPr marL="0" indent="0">
+              <a:buNone/>
+            </a:pPr>
+            <a:r>
+              <a:rPr lang="en-US" sz="1000" b="1" i="1" dirty="0"/>
+              <a:t>Before Cube Root transformation.			               After Cube Root transformation.</a:t>
+            </a:r>
+          </a:p>
+          <a:p>
+            <a:pPr marL="0" indent="0">
+              <a:buNone/>
+            </a:pPr>
+            <a:endParaRPr lang="en-US" sz="1400" dirty="0"/>
+          </a:p>
+          <a:p>
+            <a:pPr marL="0" indent="0">
+              <a:buNone/>
+            </a:pPr>
             <a:endParaRPr lang="en-US" sz="1200" dirty="0"/>
           </a:p>
           <a:p>
             <a:pPr marL="0" indent="0">
               <a:buNone/>
             </a:pPr>
-            <a:r>
-              <a:rPr lang="en-US" sz="1600" b="1" dirty="0"/>
-              <a:t>Inverse</a:t>
-            </a:r>
+            <a:endParaRPr lang="en-US" sz="1200" dirty="0"/>
           </a:p>
           <a:p>
             <a:pPr marL="0" indent="0">
               <a:buNone/>
             </a:pPr>
-            <a:r>
-              <a:rPr lang="en-US" sz="800" dirty="0"/>
-              <a:t>    (</a:t>
-            </a:r>
-            <a:r>
-              <a:rPr lang="en-US" sz="800" b="1" i="1" dirty="0"/>
-              <a:t>Before Logarithmic Transformation</a:t>
-            </a:r>
-            <a:r>
-              <a:rPr lang="en-US" sz="800" dirty="0"/>
-              <a:t>)          (</a:t>
-            </a:r>
-            <a:r>
-              <a:rPr lang="en-US" sz="800" b="1" i="1" dirty="0"/>
-              <a:t>After Logarithmic Transformation</a:t>
-            </a:r>
-            <a:r>
-              <a:rPr lang="en-US" sz="800" dirty="0"/>
-              <a:t>)</a:t>
-            </a:r>
+            <a:endParaRPr lang="en-US" sz="1200" dirty="0"/>
           </a:p>
           <a:p>
             <a:pPr marL="0" indent="0">
@@ -8663,10 +9063,70 @@
           </a:p>
         </p:txBody>
       </p:sp>
+      <p:pic>
+        <p:nvPicPr>
+          <p:cNvPr id="9" name="Picture 8" descr="A picture containing chart&#10;&#10;Description automatically generated">
+            <a:extLst>
+              <a:ext uri="{FF2B5EF4-FFF2-40B4-BE49-F238E27FC236}">
+                <a16:creationId xmlns:a16="http://schemas.microsoft.com/office/drawing/2014/main" id="{35EE78FE-9884-DC4B-99EB-5CF548D73F4F}"/>
+              </a:ext>
+            </a:extLst>
+          </p:cNvPr>
+          <p:cNvPicPr>
+            <a:picLocks noChangeAspect="1"/>
+          </p:cNvPicPr>
+          <p:nvPr/>
+        </p:nvPicPr>
+        <p:blipFill>
+          <a:blip r:embed="rId2"/>
+          <a:stretch>
+            <a:fillRect/>
+          </a:stretch>
+        </p:blipFill>
+        <p:spPr>
+          <a:xfrm>
+            <a:off x="5764108" y="2972378"/>
+            <a:ext cx="4530074" cy="2264641"/>
+          </a:xfrm>
+          <a:prstGeom prst="rect">
+            <a:avLst/>
+          </a:prstGeom>
+        </p:spPr>
+      </p:pic>
+      <p:pic>
+        <p:nvPicPr>
+          <p:cNvPr id="11" name="Picture 10" descr="A picture containing graphical user interface&#10;&#10;Description automatically generated">
+            <a:extLst>
+              <a:ext uri="{FF2B5EF4-FFF2-40B4-BE49-F238E27FC236}">
+                <a16:creationId xmlns:a16="http://schemas.microsoft.com/office/drawing/2014/main" id="{3BC8BB06-5AE4-1145-BA31-B1DCEB2A0BA1}"/>
+              </a:ext>
+            </a:extLst>
+          </p:cNvPr>
+          <p:cNvPicPr>
+            <a:picLocks noChangeAspect="1"/>
+          </p:cNvPicPr>
+          <p:nvPr/>
+        </p:nvPicPr>
+        <p:blipFill>
+          <a:blip r:embed="rId3"/>
+          <a:stretch>
+            <a:fillRect/>
+          </a:stretch>
+        </p:blipFill>
+        <p:spPr>
+          <a:xfrm>
+            <a:off x="680321" y="2972378"/>
+            <a:ext cx="4396570" cy="2190808"/>
+          </a:xfrm>
+          <a:prstGeom prst="rect">
+            <a:avLst/>
+          </a:prstGeom>
+        </p:spPr>
+      </p:pic>
     </p:spTree>
     <p:extLst>
       <p:ext uri="{BB962C8B-B14F-4D97-AF65-F5344CB8AC3E}">
-        <p14:creationId xmlns:p14="http://schemas.microsoft.com/office/powerpoint/2010/main" val="142848313"/>
+        <p14:creationId xmlns:p14="http://schemas.microsoft.com/office/powerpoint/2010/main" val="4052401024"/>
       </p:ext>
     </p:extLst>
   </p:cSld>
@@ -8744,67 +9204,91 @@
               <a:buNone/>
             </a:pPr>
             <a:r>
-              <a:rPr lang="en-US" b="1" dirty="0"/>
-              <a:t>Calendar Adjustments</a:t>
-            </a:r>
+              <a:rPr lang="en-US" sz="1400" dirty="0"/>
+              <a:t>C. Log -&gt; log(𝑥)</a:t>
+            </a:r>
+            <a:endParaRPr lang="en-US" sz="1200" dirty="0"/>
           </a:p>
           <a:p>
             <a:pPr marL="0" indent="0">
               <a:buNone/>
             </a:pPr>
             <a:r>
-              <a:rPr lang="en-US" sz="1600" b="1" dirty="0"/>
-              <a:t>Logarithmic</a:t>
-            </a:r>
-            <a:endParaRPr lang="en-US" sz="1400" b="1" dirty="0"/>
+              <a:rPr lang="en-US" sz="1200" dirty="0"/>
+              <a:t>A log transform will transform skewed data to approximately conform to normality.</a:t>
+            </a:r>
           </a:p>
           <a:p>
             <a:pPr marL="0" indent="0">
               <a:buNone/>
             </a:pPr>
-            <a:r>
-              <a:rPr lang="en-US" sz="1200" dirty="0"/>
-              <a:t>Some text.</a:t>
-            </a:r>
+            <a:endParaRPr lang="en-US" sz="1200" dirty="0"/>
           </a:p>
           <a:p>
             <a:pPr marL="0" indent="0">
               <a:buNone/>
             </a:pPr>
+            <a:endParaRPr lang="en-US" sz="1200" dirty="0"/>
+          </a:p>
+          <a:p>
+            <a:pPr marL="0" indent="0">
+              <a:buNone/>
+            </a:pPr>
+            <a:endParaRPr lang="en-US" sz="1200" dirty="0"/>
+          </a:p>
+          <a:p>
+            <a:pPr marL="0" indent="0">
+              <a:buNone/>
+            </a:pPr>
+            <a:endParaRPr lang="en-US" sz="1200" dirty="0"/>
+          </a:p>
+          <a:p>
+            <a:pPr marL="0" indent="0">
+              <a:buNone/>
+            </a:pPr>
             <a:endParaRPr lang="en-US" sz="1600" b="1" dirty="0"/>
           </a:p>
           <a:p>
             <a:pPr marL="0" indent="0">
               <a:buNone/>
             </a:pPr>
-            <a:r>
-              <a:rPr lang="en-US" sz="1600" b="1" dirty="0"/>
-              <a:t>Power (x√,x3)</a:t>
-            </a:r>
+            <a:endParaRPr lang="en-US" sz="1600" b="1" dirty="0"/>
           </a:p>
           <a:p>
             <a:pPr marL="0" indent="0">
               <a:buNone/>
             </a:pPr>
-            <a:r>
-              <a:rPr lang="en-US" sz="1200" dirty="0"/>
-              <a:t>Some text.</a:t>
-            </a:r>
+            <a:endParaRPr lang="en-US" sz="1600" b="1" dirty="0"/>
           </a:p>
           <a:p>
             <a:pPr marL="0" indent="0">
               <a:buNone/>
             </a:pPr>
-            <a:endParaRPr lang="en-US" sz="1200" dirty="0"/>
+            <a:endParaRPr lang="en-US" sz="1600" b="1" dirty="0"/>
           </a:p>
           <a:p>
             <a:pPr marL="0" indent="0">
               <a:buNone/>
             </a:pPr>
-            <a:r>
-              <a:rPr lang="en-US" sz="1600" b="1" dirty="0"/>
-              <a:t>Inverse</a:t>
-            </a:r>
+            <a:endParaRPr lang="en-US" sz="1600" b="1" dirty="0"/>
+          </a:p>
+          <a:p>
+            <a:pPr marL="0" indent="0">
+              <a:buNone/>
+            </a:pPr>
+            <a:r>
+              <a:rPr lang="en-US" sz="1050" b="1" i="1" dirty="0"/>
+              <a:t>Before Logarithmic Transformation.</a:t>
+            </a:r>
+            <a:r>
+              <a:rPr lang="en-US" sz="1050" dirty="0"/>
+              <a:t>                       </a:t>
+            </a:r>
+            <a:r>
+              <a:rPr lang="en-US" sz="1050" b="1" i="1" dirty="0"/>
+              <a:t>After Logarithmic Transformation.</a:t>
+            </a:r>
+            <a:endParaRPr lang="en-US" sz="1050" dirty="0"/>
           </a:p>
           <a:p>
             <a:pPr marL="0" indent="0">
@@ -8848,7 +9332,7 @@
           <p:cNvPr id="5" name="TextBox 4">
             <a:extLst>
               <a:ext uri="{FF2B5EF4-FFF2-40B4-BE49-F238E27FC236}">
-                <a16:creationId xmlns:a16="http://schemas.microsoft.com/office/drawing/2014/main" id="{3B11B03F-1D94-234E-AF2D-BD7312C1808B}"/>
+                <a16:creationId xmlns:a16="http://schemas.microsoft.com/office/drawing/2014/main" id="{8EE40ED9-1C0A-4C4E-9863-74EE11F820A9}"/>
               </a:ext>
             </a:extLst>
           </p:cNvPr>
@@ -8857,8 +9341,8 @@
         </p:nvSpPr>
         <p:spPr>
           <a:xfrm>
-            <a:off x="10798989" y="1025490"/>
-            <a:ext cx="1183336" cy="523220"/>
+            <a:off x="10654557" y="1025490"/>
+            <a:ext cx="1468159" cy="523220"/>
           </a:xfrm>
           <a:prstGeom prst="rect">
             <a:avLst/>
@@ -8874,22 +9358,52 @@
             <a:pPr algn="ctr"/>
             <a:r>
               <a:rPr lang="en-US" sz="1400" dirty="0"/>
-              <a:t>Calendar</a:t>
+              <a:t>Mathematical</a:t>
             </a:r>
           </a:p>
           <a:p>
             <a:pPr algn="ctr"/>
             <a:r>
               <a:rPr lang="en-US" sz="1400" dirty="0"/>
-              <a:t>Adjustments</a:t>
-            </a:r>
-          </a:p>
-        </p:txBody>
-      </p:sp>
+              <a:t>Transformations</a:t>
+            </a:r>
+          </a:p>
+        </p:txBody>
+      </p:sp>
+      <p:pic>
+        <p:nvPicPr>
+          <p:cNvPr id="7" name="Picture 6" descr="Chart, histogram&#10;&#10;Description automatically generated">
+            <a:extLst>
+              <a:ext uri="{FF2B5EF4-FFF2-40B4-BE49-F238E27FC236}">
+                <a16:creationId xmlns:a16="http://schemas.microsoft.com/office/drawing/2014/main" id="{A1C5E6CC-0287-C642-8BC1-95A337424022}"/>
+              </a:ext>
+            </a:extLst>
+          </p:cNvPr>
+          <p:cNvPicPr>
+            <a:picLocks noChangeAspect="1"/>
+          </p:cNvPicPr>
+          <p:nvPr/>
+        </p:nvPicPr>
+        <p:blipFill>
+          <a:blip r:embed="rId2"/>
+          <a:stretch>
+            <a:fillRect/>
+          </a:stretch>
+        </p:blipFill>
+        <p:spPr>
+          <a:xfrm>
+            <a:off x="756665" y="3041392"/>
+            <a:ext cx="6277303" cy="2615544"/>
+          </a:xfrm>
+          <a:prstGeom prst="rect">
+            <a:avLst/>
+          </a:prstGeom>
+        </p:spPr>
+      </p:pic>
     </p:spTree>
     <p:extLst>
       <p:ext uri="{BB962C8B-B14F-4D97-AF65-F5344CB8AC3E}">
-        <p14:creationId xmlns:p14="http://schemas.microsoft.com/office/powerpoint/2010/main" val="1877975350"/>
+        <p14:creationId xmlns:p14="http://schemas.microsoft.com/office/powerpoint/2010/main" val="2941228201"/>
       </p:ext>
     </p:extLst>
   </p:cSld>
@@ -8960,26 +9474,28 @@
           </a:xfrm>
         </p:spPr>
         <p:txBody>
-          <a:bodyPr/>
+          <a:bodyPr>
+            <a:normAutofit/>
+          </a:bodyPr>
           <a:lstStyle/>
           <a:p>
             <a:pPr marL="0" indent="0">
               <a:buNone/>
             </a:pPr>
             <a:r>
-              <a:rPr lang="en-US" b="1" dirty="0"/>
-              <a:t>Population Adjustments</a:t>
-            </a:r>
+              <a:rPr lang="en-US" sz="1400" dirty="0"/>
+              <a:t>D. Box Cox</a:t>
+            </a:r>
+            <a:endParaRPr lang="en-US" sz="1400" baseline="30000" dirty="0"/>
           </a:p>
           <a:p>
             <a:pPr marL="0" indent="0">
               <a:buNone/>
             </a:pPr>
             <a:r>
-              <a:rPr lang="en-US" sz="1600" b="1" dirty="0"/>
-              <a:t>Logarithmic</a:t>
-            </a:r>
-            <a:endParaRPr lang="en-US" sz="1400" b="1" dirty="0"/>
+              <a:rPr lang="en-US" sz="1200" dirty="0"/>
+              <a:t>Used to identify the ideal Lambda needed to normalize the time series. The Lambda value indicates the power to which all data should be raised.</a:t>
+            </a:r>
           </a:p>
           <a:p>
             <a:pPr marL="0" indent="0">
@@ -8987,47 +9503,96 @@
             </a:pPr>
             <a:r>
               <a:rPr lang="en-US" sz="1200" dirty="0"/>
-              <a:t>Some text.</a:t>
-            </a:r>
+              <a:t> </a:t>
+            </a:r>
+            <a:endParaRPr lang="en-US" sz="1400" baseline="30000" dirty="0"/>
           </a:p>
           <a:p>
             <a:pPr marL="0" indent="0">
               <a:buNone/>
             </a:pPr>
-            <a:endParaRPr lang="en-US" sz="1600" b="1" dirty="0"/>
+            <a:endParaRPr lang="en-US" sz="1400" baseline="30000" dirty="0"/>
           </a:p>
           <a:p>
             <a:pPr marL="0" indent="0">
               <a:buNone/>
             </a:pPr>
-            <a:r>
-              <a:rPr lang="en-US" sz="1600" b="1" dirty="0"/>
-              <a:t>Power (x√,x3)</a:t>
-            </a:r>
+            <a:endParaRPr lang="en-US" sz="1400" baseline="30000" dirty="0"/>
           </a:p>
           <a:p>
             <a:pPr marL="0" indent="0">
               <a:buNone/>
             </a:pPr>
-            <a:r>
-              <a:rPr lang="en-US" sz="1200" dirty="0"/>
-              <a:t>Some text.</a:t>
-            </a:r>
+            <a:endParaRPr lang="en-US" sz="1400" baseline="30000" dirty="0"/>
           </a:p>
           <a:p>
             <a:pPr marL="0" indent="0">
               <a:buNone/>
             </a:pPr>
+            <a:endParaRPr lang="en-US" sz="1400" baseline="30000" dirty="0"/>
+          </a:p>
+          <a:p>
+            <a:pPr marL="0" indent="0">
+              <a:buNone/>
+            </a:pPr>
+            <a:endParaRPr lang="en-US" sz="1400" baseline="30000" dirty="0"/>
+          </a:p>
+          <a:p>
+            <a:pPr marL="0" indent="0">
+              <a:buNone/>
+            </a:pPr>
+            <a:endParaRPr lang="en-US" sz="1400" baseline="30000" dirty="0"/>
+          </a:p>
+          <a:p>
+            <a:pPr marL="0" indent="0">
+              <a:buNone/>
+            </a:pPr>
+            <a:endParaRPr lang="en-US" sz="1400" baseline="30000" dirty="0"/>
+          </a:p>
+          <a:p>
+            <a:pPr marL="0" indent="0">
+              <a:buNone/>
+            </a:pPr>
+            <a:endParaRPr lang="en-US" sz="1400" baseline="30000" dirty="0"/>
+          </a:p>
+          <a:p>
+            <a:pPr marL="0" indent="0">
+              <a:buNone/>
+            </a:pPr>
+            <a:endParaRPr lang="en-US" sz="1400" dirty="0"/>
+          </a:p>
+          <a:p>
+            <a:pPr marL="0" indent="0">
+              <a:buNone/>
+            </a:pPr>
+            <a:r>
+              <a:rPr lang="en-US" sz="1000" b="1" i="1" dirty="0"/>
+              <a:t>Manual Log transformation with Lambda set to 0 .                                           Box Cox transformation with selected ideal Lambda value of -0.152542.</a:t>
+            </a:r>
+          </a:p>
+          <a:p>
+            <a:pPr marL="0" indent="0">
+              <a:buNone/>
+            </a:pPr>
+            <a:endParaRPr lang="en-US" sz="1400" dirty="0"/>
+          </a:p>
+          <a:p>
+            <a:pPr marL="0" indent="0">
+              <a:buNone/>
+            </a:pPr>
             <a:endParaRPr lang="en-US" sz="1200" dirty="0"/>
           </a:p>
           <a:p>
             <a:pPr marL="0" indent="0">
               <a:buNone/>
             </a:pPr>
-            <a:r>
-              <a:rPr lang="en-US" sz="1600" b="1" dirty="0"/>
-              <a:t>Inverse</a:t>
-            </a:r>
+            <a:endParaRPr lang="en-US" sz="1200" dirty="0"/>
+          </a:p>
+          <a:p>
+            <a:pPr marL="0" indent="0">
+              <a:buNone/>
+            </a:pPr>
+            <a:endParaRPr lang="en-US" sz="1200" dirty="0"/>
           </a:p>
           <a:p>
             <a:pPr marL="0" indent="0">
@@ -9071,7 +9636,7 @@
           <p:cNvPr id="5" name="TextBox 4">
             <a:extLst>
               <a:ext uri="{FF2B5EF4-FFF2-40B4-BE49-F238E27FC236}">
-                <a16:creationId xmlns:a16="http://schemas.microsoft.com/office/drawing/2014/main" id="{E957E86E-3381-C246-8C57-00F5C98C2EB2}"/>
+                <a16:creationId xmlns:a16="http://schemas.microsoft.com/office/drawing/2014/main" id="{8EE40ED9-1C0A-4C4E-9863-74EE11F820A9}"/>
               </a:ext>
             </a:extLst>
           </p:cNvPr>
@@ -9080,8 +9645,8 @@
         </p:nvSpPr>
         <p:spPr>
           <a:xfrm>
-            <a:off x="10798034" y="1025490"/>
-            <a:ext cx="1183336" cy="523220"/>
+            <a:off x="10654557" y="1025490"/>
+            <a:ext cx="1468159" cy="523220"/>
           </a:xfrm>
           <a:prstGeom prst="rect">
             <a:avLst/>
@@ -9097,22 +9662,82 @@
             <a:pPr algn="ctr"/>
             <a:r>
               <a:rPr lang="en-US" sz="1400" dirty="0"/>
-              <a:t>Population</a:t>
+              <a:t>Mathematical</a:t>
             </a:r>
           </a:p>
           <a:p>
             <a:pPr algn="ctr"/>
             <a:r>
               <a:rPr lang="en-US" sz="1400" dirty="0"/>
-              <a:t>Adjustments</a:t>
-            </a:r>
-          </a:p>
-        </p:txBody>
-      </p:sp>
+              <a:t>Transformations</a:t>
+            </a:r>
+          </a:p>
+        </p:txBody>
+      </p:sp>
+      <p:pic>
+        <p:nvPicPr>
+          <p:cNvPr id="7" name="Picture 6" descr="Graphical user interface&#10;&#10;Description automatically generated with medium confidence">
+            <a:extLst>
+              <a:ext uri="{FF2B5EF4-FFF2-40B4-BE49-F238E27FC236}">
+                <a16:creationId xmlns:a16="http://schemas.microsoft.com/office/drawing/2014/main" id="{ADCAC83A-83BA-6A44-A2D6-84C08EEA9B50}"/>
+              </a:ext>
+            </a:extLst>
+          </p:cNvPr>
+          <p:cNvPicPr>
+            <a:picLocks noChangeAspect="1"/>
+          </p:cNvPicPr>
+          <p:nvPr/>
+        </p:nvPicPr>
+        <p:blipFill>
+          <a:blip r:embed="rId2"/>
+          <a:stretch>
+            <a:fillRect/>
+          </a:stretch>
+        </p:blipFill>
+        <p:spPr>
+          <a:xfrm>
+            <a:off x="680321" y="3283350"/>
+            <a:ext cx="3841164" cy="2357581"/>
+          </a:xfrm>
+          <a:prstGeom prst="rect">
+            <a:avLst/>
+          </a:prstGeom>
+        </p:spPr>
+      </p:pic>
+      <p:pic>
+        <p:nvPicPr>
+          <p:cNvPr id="10" name="Picture 9" descr="Chart, histogram&#10;&#10;Description automatically generated">
+            <a:extLst>
+              <a:ext uri="{FF2B5EF4-FFF2-40B4-BE49-F238E27FC236}">
+                <a16:creationId xmlns:a16="http://schemas.microsoft.com/office/drawing/2014/main" id="{0E23DAE9-0BAC-1741-84BF-3888CE7F21CF}"/>
+              </a:ext>
+            </a:extLst>
+          </p:cNvPr>
+          <p:cNvPicPr>
+            <a:picLocks noChangeAspect="1"/>
+          </p:cNvPicPr>
+          <p:nvPr/>
+        </p:nvPicPr>
+        <p:blipFill>
+          <a:blip r:embed="rId3"/>
+          <a:stretch>
+            <a:fillRect/>
+          </a:stretch>
+        </p:blipFill>
+        <p:spPr>
+          <a:xfrm>
+            <a:off x="5234440" y="3283350"/>
+            <a:ext cx="4020395" cy="2357581"/>
+          </a:xfrm>
+          <a:prstGeom prst="rect">
+            <a:avLst/>
+          </a:prstGeom>
+        </p:spPr>
+      </p:pic>
     </p:spTree>
     <p:extLst>
       <p:ext uri="{BB962C8B-B14F-4D97-AF65-F5344CB8AC3E}">
-        <p14:creationId xmlns:p14="http://schemas.microsoft.com/office/powerpoint/2010/main" val="3745016284"/>
+        <p14:creationId xmlns:p14="http://schemas.microsoft.com/office/powerpoint/2010/main" val="2391501962"/>
       </p:ext>
     </p:extLst>
   </p:cSld>
@@ -9178,7 +9803,7 @@
         </p:nvSpPr>
         <p:spPr>
           <a:xfrm>
-            <a:off x="680320" y="2347383"/>
+            <a:off x="680321" y="2336872"/>
             <a:ext cx="9613861" cy="4250539"/>
           </a:xfrm>
         </p:spPr>
@@ -9191,7 +9816,7 @@
             </a:pPr>
             <a:r>
               <a:rPr lang="en-US" b="1" dirty="0"/>
-              <a:t>Inflation Adjustments</a:t>
+              <a:t>Calendar Adjustment</a:t>
             </a:r>
           </a:p>
           <a:p>
@@ -9199,10 +9824,9 @@
               <a:buNone/>
             </a:pPr>
             <a:r>
-              <a:rPr lang="en-US" sz="1600" b="1" dirty="0"/>
-              <a:t>Logarithmic</a:t>
-            </a:r>
-            <a:endParaRPr lang="en-US" sz="1400" b="1" dirty="0"/>
+              <a:rPr lang="en-US" sz="1200" dirty="0"/>
+              <a:t>Used to remove calendar variations from a time series.</a:t>
+            </a:r>
           </a:p>
           <a:p>
             <a:pPr marL="0" indent="0">
@@ -9210,53 +9834,20 @@
             </a:pPr>
             <a:r>
               <a:rPr lang="en-US" sz="1200" dirty="0"/>
-              <a:t>Some text.</a:t>
+              <a:t>Calendar variations include:</a:t>
             </a:r>
           </a:p>
           <a:p>
             <a:pPr marL="0" indent="0">
               <a:buNone/>
             </a:pPr>
+            <a:endParaRPr lang="en-US" sz="1200" dirty="0"/>
+          </a:p>
+          <a:p>
+            <a:pPr marL="0" indent="0">
+              <a:buNone/>
+            </a:pPr>
             <a:endParaRPr lang="en-US" sz="1600" b="1" dirty="0"/>
-          </a:p>
-          <a:p>
-            <a:pPr marL="0" indent="0">
-              <a:buNone/>
-            </a:pPr>
-            <a:r>
-              <a:rPr lang="en-US" sz="1600" b="1" dirty="0"/>
-              <a:t>Power (x√,x3)</a:t>
-            </a:r>
-          </a:p>
-          <a:p>
-            <a:pPr marL="0" indent="0">
-              <a:buNone/>
-            </a:pPr>
-            <a:r>
-              <a:rPr lang="en-US" sz="1200" dirty="0"/>
-              <a:t>Some text.</a:t>
-            </a:r>
-          </a:p>
-          <a:p>
-            <a:pPr marL="0" indent="0">
-              <a:buNone/>
-            </a:pPr>
-            <a:endParaRPr lang="en-US" sz="1200" dirty="0"/>
-          </a:p>
-          <a:p>
-            <a:pPr marL="0" indent="0">
-              <a:buNone/>
-            </a:pPr>
-            <a:r>
-              <a:rPr lang="en-US" sz="1600" b="1" dirty="0"/>
-              <a:t>Inverse</a:t>
-            </a:r>
-          </a:p>
-          <a:p>
-            <a:pPr marL="0" indent="0">
-              <a:buNone/>
-            </a:pPr>
-            <a:endParaRPr lang="en-US" sz="1200" dirty="0"/>
           </a:p>
         </p:txBody>
       </p:sp>
@@ -9294,7 +9885,7 @@
           <p:cNvPr id="5" name="TextBox 4">
             <a:extLst>
               <a:ext uri="{FF2B5EF4-FFF2-40B4-BE49-F238E27FC236}">
-                <a16:creationId xmlns:a16="http://schemas.microsoft.com/office/drawing/2014/main" id="{7895024F-CFF8-2343-A5E4-E5E4E3EF9E24}"/>
+                <a16:creationId xmlns:a16="http://schemas.microsoft.com/office/drawing/2014/main" id="{3B11B03F-1D94-234E-AF2D-BD7312C1808B}"/>
               </a:ext>
             </a:extLst>
           </p:cNvPr>
@@ -9303,8 +9894,8 @@
         </p:nvSpPr>
         <p:spPr>
           <a:xfrm>
-            <a:off x="10753438" y="1025490"/>
-            <a:ext cx="1227965" cy="523220"/>
+            <a:off x="10835056" y="1025490"/>
+            <a:ext cx="1111202" cy="523220"/>
           </a:xfrm>
           <a:prstGeom prst="rect">
             <a:avLst/>
@@ -9320,14 +9911,14 @@
             <a:pPr algn="ctr"/>
             <a:r>
               <a:rPr lang="en-US" sz="1400" dirty="0"/>
-              <a:t>Inflation</a:t>
+              <a:t>Calendar</a:t>
             </a:r>
           </a:p>
           <a:p>
             <a:pPr algn="ctr"/>
             <a:r>
               <a:rPr lang="en-US" sz="1400" dirty="0"/>
-              <a:t> Adjustments</a:t>
+              <a:t>Adjustment</a:t>
             </a:r>
           </a:p>
         </p:txBody>
@@ -9335,7 +9926,230 @@
     </p:spTree>
     <p:extLst>
       <p:ext uri="{BB962C8B-B14F-4D97-AF65-F5344CB8AC3E}">
-        <p14:creationId xmlns:p14="http://schemas.microsoft.com/office/powerpoint/2010/main" val="174790273"/>
+        <p14:creationId xmlns:p14="http://schemas.microsoft.com/office/powerpoint/2010/main" val="1877975350"/>
+      </p:ext>
+    </p:extLst>
+  </p:cSld>
+  <p:clrMapOvr>
+    <a:masterClrMapping/>
+  </p:clrMapOvr>
+</p:sld>
+</file>
+
+<file path=ppt/slides/slide9.xml><?xml version="1.0" encoding="utf-8"?>
+<p:sld xmlns:a="http://schemas.openxmlformats.org/drawingml/2006/main" xmlns:r="http://schemas.openxmlformats.org/officeDocument/2006/relationships" xmlns:p="http://schemas.openxmlformats.org/presentationml/2006/main">
+  <p:cSld>
+    <p:spTree>
+      <p:nvGrpSpPr>
+        <p:cNvPr id="1" name=""/>
+        <p:cNvGrpSpPr/>
+        <p:nvPr/>
+      </p:nvGrpSpPr>
+      <p:grpSpPr>
+        <a:xfrm>
+          <a:off x="0" y="0"/>
+          <a:ext cx="0" cy="0"/>
+          <a:chOff x="0" y="0"/>
+          <a:chExt cx="0" cy="0"/>
+        </a:xfrm>
+      </p:grpSpPr>
+      <p:sp>
+        <p:nvSpPr>
+          <p:cNvPr id="2" name="Title 1"/>
+          <p:cNvSpPr>
+            <a:spLocks noGrp="1"/>
+          </p:cNvSpPr>
+          <p:nvPr>
+            <p:ph type="title"/>
+          </p:nvPr>
+        </p:nvSpPr>
+        <p:spPr>
+          <a:xfrm>
+            <a:off x="680321" y="753229"/>
+            <a:ext cx="9613861" cy="592096"/>
+          </a:xfrm>
+        </p:spPr>
+        <p:txBody>
+          <a:bodyPr/>
+          <a:lstStyle/>
+          <a:p>
+            <a:r>
+              <a:rPr lang="en-US" dirty="0"/>
+              <a:t>Time Series Decomposition</a:t>
+            </a:r>
+          </a:p>
+        </p:txBody>
+      </p:sp>
+      <p:sp>
+        <p:nvSpPr>
+          <p:cNvPr id="3" name="Content Placeholder 2"/>
+          <p:cNvSpPr>
+            <a:spLocks noGrp="1"/>
+          </p:cNvSpPr>
+          <p:nvPr>
+            <p:ph idx="1"/>
+          </p:nvPr>
+        </p:nvSpPr>
+        <p:spPr>
+          <a:xfrm>
+            <a:off x="680321" y="2336872"/>
+            <a:ext cx="9613861" cy="4250539"/>
+          </a:xfrm>
+        </p:spPr>
+        <p:txBody>
+          <a:bodyPr/>
+          <a:lstStyle/>
+          <a:p>
+            <a:pPr marL="0" indent="0">
+              <a:buNone/>
+            </a:pPr>
+            <a:r>
+              <a:rPr lang="en-US" b="1" dirty="0"/>
+              <a:t>Population Adjustments</a:t>
+            </a:r>
+          </a:p>
+          <a:p>
+            <a:pPr marL="0" indent="0">
+              <a:buNone/>
+            </a:pPr>
+            <a:r>
+              <a:rPr lang="en-US" sz="1600" b="1" dirty="0"/>
+              <a:t>Logarithmic</a:t>
+            </a:r>
+            <a:endParaRPr lang="en-US" sz="1400" b="1" dirty="0"/>
+          </a:p>
+          <a:p>
+            <a:pPr marL="0" indent="0">
+              <a:buNone/>
+            </a:pPr>
+            <a:r>
+              <a:rPr lang="en-US" sz="1200" dirty="0"/>
+              <a:t>Some text.</a:t>
+            </a:r>
+          </a:p>
+          <a:p>
+            <a:pPr marL="0" indent="0">
+              <a:buNone/>
+            </a:pPr>
+            <a:endParaRPr lang="en-US" sz="1600" b="1" dirty="0"/>
+          </a:p>
+          <a:p>
+            <a:pPr marL="0" indent="0">
+              <a:buNone/>
+            </a:pPr>
+            <a:r>
+              <a:rPr lang="en-US" sz="1600" b="1" dirty="0"/>
+              <a:t>Power (x√,x3)</a:t>
+            </a:r>
+          </a:p>
+          <a:p>
+            <a:pPr marL="0" indent="0">
+              <a:buNone/>
+            </a:pPr>
+            <a:r>
+              <a:rPr lang="en-US" sz="1200" dirty="0"/>
+              <a:t>Some text.</a:t>
+            </a:r>
+          </a:p>
+          <a:p>
+            <a:pPr marL="0" indent="0">
+              <a:buNone/>
+            </a:pPr>
+            <a:endParaRPr lang="en-US" sz="1200" dirty="0"/>
+          </a:p>
+          <a:p>
+            <a:pPr marL="0" indent="0">
+              <a:buNone/>
+            </a:pPr>
+            <a:r>
+              <a:rPr lang="en-US" sz="1600" b="1" dirty="0"/>
+              <a:t>Inverse</a:t>
+            </a:r>
+          </a:p>
+          <a:p>
+            <a:pPr marL="0" indent="0">
+              <a:buNone/>
+            </a:pPr>
+            <a:endParaRPr lang="en-US" sz="1200" dirty="0"/>
+          </a:p>
+        </p:txBody>
+      </p:sp>
+      <p:sp>
+        <p:nvSpPr>
+          <p:cNvPr id="4" name="TextBox 3"/>
+          <p:cNvSpPr txBox="1"/>
+          <p:nvPr/>
+        </p:nvSpPr>
+        <p:spPr>
+          <a:xfrm>
+            <a:off x="948488" y="1287100"/>
+            <a:ext cx="4078361" cy="369332"/>
+          </a:xfrm>
+          <a:prstGeom prst="rect">
+            <a:avLst/>
+          </a:prstGeom>
+          <a:noFill/>
+        </p:spPr>
+        <p:txBody>
+          <a:bodyPr wrap="none" rtlCol="0">
+            <a:spAutoFit/>
+          </a:bodyPr>
+          <a:lstStyle/>
+          <a:p>
+            <a:r>
+              <a:rPr lang="en-US" dirty="0"/>
+              <a:t>Transformation and Adjustment Types</a:t>
+            </a:r>
+          </a:p>
+        </p:txBody>
+      </p:sp>
+      <p:sp>
+        <p:nvSpPr>
+          <p:cNvPr id="5" name="TextBox 4">
+            <a:extLst>
+              <a:ext uri="{FF2B5EF4-FFF2-40B4-BE49-F238E27FC236}">
+                <a16:creationId xmlns:a16="http://schemas.microsoft.com/office/drawing/2014/main" id="{E957E86E-3381-C246-8C57-00F5C98C2EB2}"/>
+              </a:ext>
+            </a:extLst>
+          </p:cNvPr>
+          <p:cNvSpPr txBox="1"/>
+          <p:nvPr/>
+        </p:nvSpPr>
+        <p:spPr>
+          <a:xfrm>
+            <a:off x="10798034" y="1025490"/>
+            <a:ext cx="1183336" cy="523220"/>
+          </a:xfrm>
+          <a:prstGeom prst="rect">
+            <a:avLst/>
+          </a:prstGeom>
+          <a:noFill/>
+        </p:spPr>
+        <p:txBody>
+          <a:bodyPr wrap="none" rtlCol="0">
+            <a:spAutoFit/>
+          </a:bodyPr>
+          <a:lstStyle/>
+          <a:p>
+            <a:pPr algn="ctr"/>
+            <a:r>
+              <a:rPr lang="en-US" sz="1400" dirty="0"/>
+              <a:t>Population</a:t>
+            </a:r>
+          </a:p>
+          <a:p>
+            <a:pPr algn="ctr"/>
+            <a:r>
+              <a:rPr lang="en-US" sz="1400" dirty="0"/>
+              <a:t>Adjustments</a:t>
+            </a:r>
+          </a:p>
+        </p:txBody>
+      </p:sp>
+    </p:spTree>
+    <p:extLst>
+      <p:ext uri="{BB962C8B-B14F-4D97-AF65-F5344CB8AC3E}">
+        <p14:creationId xmlns:p14="http://schemas.microsoft.com/office/powerpoint/2010/main" val="3745016284"/>
       </p:ext>
     </p:extLst>
   </p:cSld>

</xml_diff>